<commit_message>
Fixed some spelling mistakes in the presentation
</commit_message>
<xml_diff>
--- a/Building Native Designed App with Xamarin and MvvmCross.pptx
+++ b/Building Native Designed App with Xamarin and MvvmCross.pptx
@@ -12077,7 +12077,7 @@
           <p:cNvPr id="5" name="Shape 244">
             <a:extLst>
               <a:ext uri="{FF2B5EF4-FFF2-40B4-BE49-F238E27FC236}">
-                <a16:creationId xmlns="" xmlns:a16="http://schemas.microsoft.com/office/drawing/2014/main" id="{ACDAC6D0-0575-487B-AA88-09B89B48E603}"/>
+                <a16:creationId xmlns:a16="http://schemas.microsoft.com/office/drawing/2014/main" xmlns="" id="{ACDAC6D0-0575-487B-AA88-09B89B48E603}"/>
               </a:ext>
             </a:extLst>
           </p:cNvPr>
@@ -12190,7 +12190,7 @@
           <p:cNvPr id="6" name="Shape 245">
             <a:extLst>
               <a:ext uri="{FF2B5EF4-FFF2-40B4-BE49-F238E27FC236}">
-                <a16:creationId xmlns="" xmlns:a16="http://schemas.microsoft.com/office/drawing/2014/main" id="{8104BA15-1A31-418A-B1CD-A85C7E4AF25A}"/>
+                <a16:creationId xmlns:a16="http://schemas.microsoft.com/office/drawing/2014/main" xmlns="" id="{8104BA15-1A31-418A-B1CD-A85C7E4AF25A}"/>
               </a:ext>
             </a:extLst>
           </p:cNvPr>
@@ -12284,7 +12284,7 @@
           <p:cNvPr id="7" name="Shape 246">
             <a:extLst>
               <a:ext uri="{FF2B5EF4-FFF2-40B4-BE49-F238E27FC236}">
-                <a16:creationId xmlns="" xmlns:a16="http://schemas.microsoft.com/office/drawing/2014/main" id="{F77C77D9-23C8-4027-A08A-C3BF6E7FF284}"/>
+                <a16:creationId xmlns:a16="http://schemas.microsoft.com/office/drawing/2014/main" xmlns="" id="{F77C77D9-23C8-4027-A08A-C3BF6E7FF284}"/>
               </a:ext>
             </a:extLst>
           </p:cNvPr>
@@ -12370,7 +12370,7 @@
           <p:cNvPr id="8" name="Shape 247">
             <a:extLst>
               <a:ext uri="{FF2B5EF4-FFF2-40B4-BE49-F238E27FC236}">
-                <a16:creationId xmlns="" xmlns:a16="http://schemas.microsoft.com/office/drawing/2014/main" id="{F3E22077-291E-4036-8152-9E8CC13A2DD1}"/>
+                <a16:creationId xmlns:a16="http://schemas.microsoft.com/office/drawing/2014/main" xmlns="" id="{F3E22077-291E-4036-8152-9E8CC13A2DD1}"/>
               </a:ext>
             </a:extLst>
           </p:cNvPr>
@@ -12404,7 +12404,7 @@
           <p:cNvPr id="10" name="Shape 249">
             <a:extLst>
               <a:ext uri="{FF2B5EF4-FFF2-40B4-BE49-F238E27FC236}">
-                <a16:creationId xmlns="" xmlns:a16="http://schemas.microsoft.com/office/drawing/2014/main" id="{71A58D54-9904-4766-AE05-90F7C538526B}"/>
+                <a16:creationId xmlns:a16="http://schemas.microsoft.com/office/drawing/2014/main" xmlns="" id="{71A58D54-9904-4766-AE05-90F7C538526B}"/>
               </a:ext>
             </a:extLst>
           </p:cNvPr>
@@ -12438,7 +12438,7 @@
           <p:cNvPr id="11" name="Shape 250">
             <a:extLst>
               <a:ext uri="{FF2B5EF4-FFF2-40B4-BE49-F238E27FC236}">
-                <a16:creationId xmlns="" xmlns:a16="http://schemas.microsoft.com/office/drawing/2014/main" id="{E5F85E10-5BC1-468D-8D42-81B3A8A2C87F}"/>
+                <a16:creationId xmlns:a16="http://schemas.microsoft.com/office/drawing/2014/main" xmlns="" id="{E5F85E10-5BC1-468D-8D42-81B3A8A2C87F}"/>
               </a:ext>
             </a:extLst>
           </p:cNvPr>
@@ -12495,7 +12495,7 @@
           <p:cNvPr id="38" name="Shape 244">
             <a:extLst>
               <a:ext uri="{FF2B5EF4-FFF2-40B4-BE49-F238E27FC236}">
-                <a16:creationId xmlns="" xmlns:a16="http://schemas.microsoft.com/office/drawing/2014/main" id="{ACDAC6D0-0575-487B-AA88-09B89B48E603}"/>
+                <a16:creationId xmlns:a16="http://schemas.microsoft.com/office/drawing/2014/main" xmlns="" id="{ACDAC6D0-0575-487B-AA88-09B89B48E603}"/>
               </a:ext>
             </a:extLst>
           </p:cNvPr>
@@ -12581,7 +12581,7 @@
           <p:cNvPr id="39" name="Shape 245">
             <a:extLst>
               <a:ext uri="{FF2B5EF4-FFF2-40B4-BE49-F238E27FC236}">
-                <a16:creationId xmlns="" xmlns:a16="http://schemas.microsoft.com/office/drawing/2014/main" id="{8104BA15-1A31-418A-B1CD-A85C7E4AF25A}"/>
+                <a16:creationId xmlns:a16="http://schemas.microsoft.com/office/drawing/2014/main" xmlns="" id="{8104BA15-1A31-418A-B1CD-A85C7E4AF25A}"/>
               </a:ext>
             </a:extLst>
           </p:cNvPr>
@@ -12667,7 +12667,7 @@
           <p:cNvPr id="40" name="Shape 246">
             <a:extLst>
               <a:ext uri="{FF2B5EF4-FFF2-40B4-BE49-F238E27FC236}">
-                <a16:creationId xmlns="" xmlns:a16="http://schemas.microsoft.com/office/drawing/2014/main" id="{F77C77D9-23C8-4027-A08A-C3BF6E7FF284}"/>
+                <a16:creationId xmlns:a16="http://schemas.microsoft.com/office/drawing/2014/main" xmlns="" id="{F77C77D9-23C8-4027-A08A-C3BF6E7FF284}"/>
               </a:ext>
             </a:extLst>
           </p:cNvPr>
@@ -12753,7 +12753,7 @@
           <p:cNvPr id="42" name="Shape 248">
             <a:extLst>
               <a:ext uri="{FF2B5EF4-FFF2-40B4-BE49-F238E27FC236}">
-                <a16:creationId xmlns="" xmlns:a16="http://schemas.microsoft.com/office/drawing/2014/main" id="{A8F19181-70B5-4D08-945D-175213300455}"/>
+                <a16:creationId xmlns:a16="http://schemas.microsoft.com/office/drawing/2014/main" xmlns="" id="{A8F19181-70B5-4D08-945D-175213300455}"/>
               </a:ext>
             </a:extLst>
           </p:cNvPr>
@@ -12787,7 +12787,7 @@
           <p:cNvPr id="43" name="Shape 249">
             <a:extLst>
               <a:ext uri="{FF2B5EF4-FFF2-40B4-BE49-F238E27FC236}">
-                <a16:creationId xmlns="" xmlns:a16="http://schemas.microsoft.com/office/drawing/2014/main" id="{71A58D54-9904-4766-AE05-90F7C538526B}"/>
+                <a16:creationId xmlns:a16="http://schemas.microsoft.com/office/drawing/2014/main" xmlns="" id="{71A58D54-9904-4766-AE05-90F7C538526B}"/>
               </a:ext>
             </a:extLst>
           </p:cNvPr>
@@ -12821,7 +12821,7 @@
           <p:cNvPr id="45" name="Shape 248">
             <a:extLst>
               <a:ext uri="{FF2B5EF4-FFF2-40B4-BE49-F238E27FC236}">
-                <a16:creationId xmlns="" xmlns:a16="http://schemas.microsoft.com/office/drawing/2014/main" id="{A8F19181-70B5-4D08-945D-175213300455}"/>
+                <a16:creationId xmlns:a16="http://schemas.microsoft.com/office/drawing/2014/main" xmlns="" id="{A8F19181-70B5-4D08-945D-175213300455}"/>
               </a:ext>
             </a:extLst>
           </p:cNvPr>
@@ -12855,7 +12855,7 @@
           <p:cNvPr id="46" name="Shape 249">
             <a:extLst>
               <a:ext uri="{FF2B5EF4-FFF2-40B4-BE49-F238E27FC236}">
-                <a16:creationId xmlns="" xmlns:a16="http://schemas.microsoft.com/office/drawing/2014/main" id="{71A58D54-9904-4766-AE05-90F7C538526B}"/>
+                <a16:creationId xmlns:a16="http://schemas.microsoft.com/office/drawing/2014/main" xmlns="" id="{71A58D54-9904-4766-AE05-90F7C538526B}"/>
               </a:ext>
             </a:extLst>
           </p:cNvPr>
@@ -12889,7 +12889,7 @@
           <p:cNvPr id="68" name="Shape 248">
             <a:extLst>
               <a:ext uri="{FF2B5EF4-FFF2-40B4-BE49-F238E27FC236}">
-                <a16:creationId xmlns="" xmlns:a16="http://schemas.microsoft.com/office/drawing/2014/main" id="{A8F19181-70B5-4D08-945D-175213300455}"/>
+                <a16:creationId xmlns:a16="http://schemas.microsoft.com/office/drawing/2014/main" xmlns="" id="{A8F19181-70B5-4D08-945D-175213300455}"/>
               </a:ext>
             </a:extLst>
           </p:cNvPr>
@@ -13237,7 +13237,7 @@
           <p:cNvPr id="33" name="Title 3">
             <a:extLst>
               <a:ext uri="{FF2B5EF4-FFF2-40B4-BE49-F238E27FC236}">
-                <a16:creationId xmlns="" xmlns:a16="http://schemas.microsoft.com/office/drawing/2014/main" id="{4D9AE115-9019-407A-A559-A5599527F288}"/>
+                <a16:creationId xmlns:a16="http://schemas.microsoft.com/office/drawing/2014/main" xmlns="" id="{4D9AE115-9019-407A-A559-A5599527F288}"/>
               </a:ext>
             </a:extLst>
           </p:cNvPr>
@@ -13479,7 +13479,7 @@
           <p:cNvPr id="20" name="Shape 298">
             <a:extLst>
               <a:ext uri="{FF2B5EF4-FFF2-40B4-BE49-F238E27FC236}">
-                <a16:creationId xmlns="" xmlns:a16="http://schemas.microsoft.com/office/drawing/2014/main" id="{BE88C897-3704-45B8-8F50-980791495ECE}"/>
+                <a16:creationId xmlns:a16="http://schemas.microsoft.com/office/drawing/2014/main" xmlns="" id="{BE88C897-3704-45B8-8F50-980791495ECE}"/>
               </a:ext>
             </a:extLst>
           </p:cNvPr>
@@ -13759,7 +13759,7 @@
           <p:cNvPr id="21" name="Shape 299">
             <a:extLst>
               <a:ext uri="{FF2B5EF4-FFF2-40B4-BE49-F238E27FC236}">
-                <a16:creationId xmlns="" xmlns:a16="http://schemas.microsoft.com/office/drawing/2014/main" id="{F8D64F71-4F05-4958-976A-508BCDDD4CD1}"/>
+                <a16:creationId xmlns:a16="http://schemas.microsoft.com/office/drawing/2014/main" xmlns="" id="{F8D64F71-4F05-4958-976A-508BCDDD4CD1}"/>
               </a:ext>
             </a:extLst>
           </p:cNvPr>
@@ -14030,7 +14030,7 @@
           <p:cNvPr id="22" name="Shape 300">
             <a:extLst>
               <a:ext uri="{FF2B5EF4-FFF2-40B4-BE49-F238E27FC236}">
-                <a16:creationId xmlns="" xmlns:a16="http://schemas.microsoft.com/office/drawing/2014/main" id="{FB01309F-ACB5-4FF4-BD1D-8B4226C8E620}"/>
+                <a16:creationId xmlns:a16="http://schemas.microsoft.com/office/drawing/2014/main" xmlns="" id="{FB01309F-ACB5-4FF4-BD1D-8B4226C8E620}"/>
               </a:ext>
             </a:extLst>
           </p:cNvPr>
@@ -14324,7 +14324,7 @@
           <p:cNvPr id="23" name="Shape 301">
             <a:extLst>
               <a:ext uri="{FF2B5EF4-FFF2-40B4-BE49-F238E27FC236}">
-                <a16:creationId xmlns="" xmlns:a16="http://schemas.microsoft.com/office/drawing/2014/main" id="{F6DF8FCA-500B-4384-9A3B-B1B2F25C93BB}"/>
+                <a16:creationId xmlns:a16="http://schemas.microsoft.com/office/drawing/2014/main" xmlns="" id="{F6DF8FCA-500B-4384-9A3B-B1B2F25C93BB}"/>
               </a:ext>
             </a:extLst>
           </p:cNvPr>
@@ -14575,7 +14575,7 @@
           <p:cNvPr id="24" name="Shape 302" descr="Shuffle.png">
             <a:extLst>
               <a:ext uri="{FF2B5EF4-FFF2-40B4-BE49-F238E27FC236}">
-                <a16:creationId xmlns="" xmlns:a16="http://schemas.microsoft.com/office/drawing/2014/main" id="{A2D1CA59-2230-41F0-AB0E-FAF11BD4EACB}"/>
+                <a16:creationId xmlns:a16="http://schemas.microsoft.com/office/drawing/2014/main" xmlns="" id="{A2D1CA59-2230-41F0-AB0E-FAF11BD4EACB}"/>
               </a:ext>
             </a:extLst>
           </p:cNvPr>
@@ -14610,7 +14610,7 @@
           <p:cNvPr id="25" name="Shape 303">
             <a:extLst>
               <a:ext uri="{FF2B5EF4-FFF2-40B4-BE49-F238E27FC236}">
-                <a16:creationId xmlns="" xmlns:a16="http://schemas.microsoft.com/office/drawing/2014/main" id="{8B99AE9A-2B1A-49F9-B929-91990A77C10B}"/>
+                <a16:creationId xmlns:a16="http://schemas.microsoft.com/office/drawing/2014/main" xmlns="" id="{8B99AE9A-2B1A-49F9-B929-91990A77C10B}"/>
               </a:ext>
             </a:extLst>
           </p:cNvPr>
@@ -14861,7 +14861,7 @@
           <p:cNvPr id="26" name="Shape 304">
             <a:extLst>
               <a:ext uri="{FF2B5EF4-FFF2-40B4-BE49-F238E27FC236}">
-                <a16:creationId xmlns="" xmlns:a16="http://schemas.microsoft.com/office/drawing/2014/main" id="{8BAF8380-7AAE-4685-AFB4-80AE0D44A401}"/>
+                <a16:creationId xmlns:a16="http://schemas.microsoft.com/office/drawing/2014/main" xmlns="" id="{8BAF8380-7AAE-4685-AFB4-80AE0D44A401}"/>
               </a:ext>
             </a:extLst>
           </p:cNvPr>
@@ -15112,7 +15112,7 @@
           <p:cNvPr id="27" name="Shape 305" descr="Settings 2.png">
             <a:extLst>
               <a:ext uri="{FF2B5EF4-FFF2-40B4-BE49-F238E27FC236}">
-                <a16:creationId xmlns="" xmlns:a16="http://schemas.microsoft.com/office/drawing/2014/main" id="{E88E5077-C028-4B6A-ADBE-4D96A769EA6F}"/>
+                <a16:creationId xmlns:a16="http://schemas.microsoft.com/office/drawing/2014/main" xmlns="" id="{E88E5077-C028-4B6A-ADBE-4D96A769EA6F}"/>
               </a:ext>
             </a:extLst>
           </p:cNvPr>
@@ -15147,7 +15147,7 @@
           <p:cNvPr id="28" name="Shape 306" descr="Star.png">
             <a:extLst>
               <a:ext uri="{FF2B5EF4-FFF2-40B4-BE49-F238E27FC236}">
-                <a16:creationId xmlns="" xmlns:a16="http://schemas.microsoft.com/office/drawing/2014/main" id="{3D5874B2-C9FB-4C3D-823C-44A9979BAC43}"/>
+                <a16:creationId xmlns:a16="http://schemas.microsoft.com/office/drawing/2014/main" xmlns="" id="{3D5874B2-C9FB-4C3D-823C-44A9979BAC43}"/>
               </a:ext>
             </a:extLst>
           </p:cNvPr>
@@ -15182,7 +15182,7 @@
           <p:cNvPr id="29" name="Shape 307">
             <a:extLst>
               <a:ext uri="{FF2B5EF4-FFF2-40B4-BE49-F238E27FC236}">
-                <a16:creationId xmlns="" xmlns:a16="http://schemas.microsoft.com/office/drawing/2014/main" id="{E83741D5-7032-4BF4-9F78-DC1B1E8FB0E9}"/>
+                <a16:creationId xmlns:a16="http://schemas.microsoft.com/office/drawing/2014/main" xmlns="" id="{E83741D5-7032-4BF4-9F78-DC1B1E8FB0E9}"/>
               </a:ext>
             </a:extLst>
           </p:cNvPr>
@@ -15219,7 +15219,7 @@
           <p:cNvPr id="30" name="Shape 308">
             <a:extLst>
               <a:ext uri="{FF2B5EF4-FFF2-40B4-BE49-F238E27FC236}">
-                <a16:creationId xmlns="" xmlns:a16="http://schemas.microsoft.com/office/drawing/2014/main" id="{AAB29D08-5214-4C78-A404-FC942F7FE317}"/>
+                <a16:creationId xmlns:a16="http://schemas.microsoft.com/office/drawing/2014/main" xmlns="" id="{AAB29D08-5214-4C78-A404-FC942F7FE317}"/>
               </a:ext>
             </a:extLst>
           </p:cNvPr>
@@ -15256,7 +15256,7 @@
           <p:cNvPr id="31" name="Shape 309">
             <a:extLst>
               <a:ext uri="{FF2B5EF4-FFF2-40B4-BE49-F238E27FC236}">
-                <a16:creationId xmlns="" xmlns:a16="http://schemas.microsoft.com/office/drawing/2014/main" id="{EB16DEAC-7664-429C-AA05-CE2684D3AB3E}"/>
+                <a16:creationId xmlns:a16="http://schemas.microsoft.com/office/drawing/2014/main" xmlns="" id="{EB16DEAC-7664-429C-AA05-CE2684D3AB3E}"/>
               </a:ext>
             </a:extLst>
           </p:cNvPr>
@@ -15288,7 +15288,7 @@
           <p:cNvPr id="32" name="Shape 310">
             <a:extLst>
               <a:ext uri="{FF2B5EF4-FFF2-40B4-BE49-F238E27FC236}">
-                <a16:creationId xmlns="" xmlns:a16="http://schemas.microsoft.com/office/drawing/2014/main" id="{8F0607E7-DE6C-4D2F-BC4C-3EA95097CF6C}"/>
+                <a16:creationId xmlns:a16="http://schemas.microsoft.com/office/drawing/2014/main" xmlns="" id="{8F0607E7-DE6C-4D2F-BC4C-3EA95097CF6C}"/>
               </a:ext>
             </a:extLst>
           </p:cNvPr>
@@ -15365,7 +15365,7 @@
           <p:cNvPr id="7" name="Shape 316">
             <a:extLst>
               <a:ext uri="{FF2B5EF4-FFF2-40B4-BE49-F238E27FC236}">
-                <a16:creationId xmlns="" xmlns:a16="http://schemas.microsoft.com/office/drawing/2014/main" id="{7C19E226-9E8B-4C40-990C-FB9C4901B79B}"/>
+                <a16:creationId xmlns:a16="http://schemas.microsoft.com/office/drawing/2014/main" xmlns="" id="{7C19E226-9E8B-4C40-990C-FB9C4901B79B}"/>
               </a:ext>
             </a:extLst>
           </p:cNvPr>
@@ -15636,7 +15636,7 @@
           <p:cNvPr id="8" name="Shape 317">
             <a:extLst>
               <a:ext uri="{FF2B5EF4-FFF2-40B4-BE49-F238E27FC236}">
-                <a16:creationId xmlns="" xmlns:a16="http://schemas.microsoft.com/office/drawing/2014/main" id="{48899B43-B62C-4F13-ABDB-9E76E877A818}"/>
+                <a16:creationId xmlns:a16="http://schemas.microsoft.com/office/drawing/2014/main" xmlns="" id="{48899B43-B62C-4F13-ABDB-9E76E877A818}"/>
               </a:ext>
             </a:extLst>
           </p:cNvPr>
@@ -15907,7 +15907,7 @@
           <p:cNvPr id="9" name="Shape 318">
             <a:extLst>
               <a:ext uri="{FF2B5EF4-FFF2-40B4-BE49-F238E27FC236}">
-                <a16:creationId xmlns="" xmlns:a16="http://schemas.microsoft.com/office/drawing/2014/main" id="{67997799-C337-4C8A-A6EA-21C882F43F93}"/>
+                <a16:creationId xmlns:a16="http://schemas.microsoft.com/office/drawing/2014/main" xmlns="" id="{67997799-C337-4C8A-A6EA-21C882F43F93}"/>
               </a:ext>
             </a:extLst>
           </p:cNvPr>
@@ -16178,7 +16178,7 @@
           <p:cNvPr id="10" name="Shape 319">
             <a:extLst>
               <a:ext uri="{FF2B5EF4-FFF2-40B4-BE49-F238E27FC236}">
-                <a16:creationId xmlns="" xmlns:a16="http://schemas.microsoft.com/office/drawing/2014/main" id="{EFA7F1A4-D062-4D18-A44F-B63FF2E8FC0F}"/>
+                <a16:creationId xmlns:a16="http://schemas.microsoft.com/office/drawing/2014/main" xmlns="" id="{EFA7F1A4-D062-4D18-A44F-B63FF2E8FC0F}"/>
               </a:ext>
             </a:extLst>
           </p:cNvPr>
@@ -16429,7 +16429,7 @@
           <p:cNvPr id="11" name="Shape 320">
             <a:extLst>
               <a:ext uri="{FF2B5EF4-FFF2-40B4-BE49-F238E27FC236}">
-                <a16:creationId xmlns="" xmlns:a16="http://schemas.microsoft.com/office/drawing/2014/main" id="{18455523-68C6-48B0-96E8-C3B2C52193DD}"/>
+                <a16:creationId xmlns:a16="http://schemas.microsoft.com/office/drawing/2014/main" xmlns="" id="{18455523-68C6-48B0-96E8-C3B2C52193DD}"/>
               </a:ext>
             </a:extLst>
           </p:cNvPr>
@@ -16680,7 +16680,7 @@
           <p:cNvPr id="12" name="Shape 321">
             <a:extLst>
               <a:ext uri="{FF2B5EF4-FFF2-40B4-BE49-F238E27FC236}">
-                <a16:creationId xmlns="" xmlns:a16="http://schemas.microsoft.com/office/drawing/2014/main" id="{EF3A0742-F4FE-4F2D-8C2D-F70387CB73FE}"/>
+                <a16:creationId xmlns:a16="http://schemas.microsoft.com/office/drawing/2014/main" xmlns="" id="{EF3A0742-F4FE-4F2D-8C2D-F70387CB73FE}"/>
               </a:ext>
             </a:extLst>
           </p:cNvPr>
@@ -16931,7 +16931,7 @@
           <p:cNvPr id="13" name="Shape 322" descr="Fill 116.png">
             <a:extLst>
               <a:ext uri="{FF2B5EF4-FFF2-40B4-BE49-F238E27FC236}">
-                <a16:creationId xmlns="" xmlns:a16="http://schemas.microsoft.com/office/drawing/2014/main" id="{00C0D57B-3C96-48A8-9D24-6DD8D81A12AA}"/>
+                <a16:creationId xmlns:a16="http://schemas.microsoft.com/office/drawing/2014/main" xmlns="" id="{00C0D57B-3C96-48A8-9D24-6DD8D81A12AA}"/>
               </a:ext>
             </a:extLst>
           </p:cNvPr>
@@ -16966,7 +16966,7 @@
           <p:cNvPr id="14" name="Shape 323" descr="Community.png">
             <a:extLst>
               <a:ext uri="{FF2B5EF4-FFF2-40B4-BE49-F238E27FC236}">
-                <a16:creationId xmlns="" xmlns:a16="http://schemas.microsoft.com/office/drawing/2014/main" id="{AB8B1D7A-2AE5-47BE-91E7-2C4EBDD847B7}"/>
+                <a16:creationId xmlns:a16="http://schemas.microsoft.com/office/drawing/2014/main" xmlns="" id="{AB8B1D7A-2AE5-47BE-91E7-2C4EBDD847B7}"/>
               </a:ext>
             </a:extLst>
           </p:cNvPr>
@@ -17001,7 +17001,7 @@
           <p:cNvPr id="15" name="Shape 324" descr="Idea.png">
             <a:extLst>
               <a:ext uri="{FF2B5EF4-FFF2-40B4-BE49-F238E27FC236}">
-                <a16:creationId xmlns="" xmlns:a16="http://schemas.microsoft.com/office/drawing/2014/main" id="{4AF217A2-8F50-4E3D-B4AD-4D40BB719549}"/>
+                <a16:creationId xmlns:a16="http://schemas.microsoft.com/office/drawing/2014/main" xmlns="" id="{4AF217A2-8F50-4E3D-B4AD-4D40BB719549}"/>
               </a:ext>
             </a:extLst>
           </p:cNvPr>
@@ -17036,7 +17036,7 @@
           <p:cNvPr id="16" name="Shape 325">
             <a:extLst>
               <a:ext uri="{FF2B5EF4-FFF2-40B4-BE49-F238E27FC236}">
-                <a16:creationId xmlns="" xmlns:a16="http://schemas.microsoft.com/office/drawing/2014/main" id="{8BF106D2-271B-4B56-B352-92D433F499C1}"/>
+                <a16:creationId xmlns:a16="http://schemas.microsoft.com/office/drawing/2014/main" xmlns="" id="{8BF106D2-271B-4B56-B352-92D433F499C1}"/>
               </a:ext>
             </a:extLst>
           </p:cNvPr>
@@ -17072,7 +17072,7 @@
           <p:cNvPr id="17" name="Shape 326">
             <a:extLst>
               <a:ext uri="{FF2B5EF4-FFF2-40B4-BE49-F238E27FC236}">
-                <a16:creationId xmlns="" xmlns:a16="http://schemas.microsoft.com/office/drawing/2014/main" id="{D9E81730-6E1F-43E5-9766-9ABCA24AD098}"/>
+                <a16:creationId xmlns:a16="http://schemas.microsoft.com/office/drawing/2014/main" xmlns="" id="{D9E81730-6E1F-43E5-9766-9ABCA24AD098}"/>
               </a:ext>
             </a:extLst>
           </p:cNvPr>
@@ -17317,7 +17317,7 @@
           <p:cNvPr id="18" name="Shape 327">
             <a:extLst>
               <a:ext uri="{FF2B5EF4-FFF2-40B4-BE49-F238E27FC236}">
-                <a16:creationId xmlns="" xmlns:a16="http://schemas.microsoft.com/office/drawing/2014/main" id="{BC3D25EA-2E4B-4E09-A47A-CCFAF750B2EC}"/>
+                <a16:creationId xmlns:a16="http://schemas.microsoft.com/office/drawing/2014/main" xmlns="" id="{BC3D25EA-2E4B-4E09-A47A-CCFAF750B2EC}"/>
               </a:ext>
             </a:extLst>
           </p:cNvPr>
@@ -17351,7 +17351,7 @@
           <p:cNvPr id="19" name="Shape 328">
             <a:extLst>
               <a:ext uri="{FF2B5EF4-FFF2-40B4-BE49-F238E27FC236}">
-                <a16:creationId xmlns="" xmlns:a16="http://schemas.microsoft.com/office/drawing/2014/main" id="{2BD46625-785A-440F-A4EA-10301E5D75AC}"/>
+                <a16:creationId xmlns:a16="http://schemas.microsoft.com/office/drawing/2014/main" xmlns="" id="{2BD46625-785A-440F-A4EA-10301E5D75AC}"/>
               </a:ext>
             </a:extLst>
           </p:cNvPr>
@@ -18066,6 +18066,13 @@
       <p:transition/>
     </mc:Fallback>
   </mc:AlternateContent>
+  <p:timing>
+    <p:tnLst>
+      <p:par>
+        <p:cTn id="1" dur="indefinite" restart="never" nodeType="tmRoot"/>
+      </p:par>
+    </p:tnLst>
+  </p:timing>
 </p:sld>
 </file>
 
@@ -18118,7 +18125,7 @@
           <p:cNvPr id="4" name="Shape 615">
             <a:extLst>
               <a:ext uri="{FF2B5EF4-FFF2-40B4-BE49-F238E27FC236}">
-                <a16:creationId xmlns="" xmlns:a16="http://schemas.microsoft.com/office/drawing/2014/main" id="{F8B8515F-9661-4402-8E77-E250565A924A}"/>
+                <a16:creationId xmlns:a16="http://schemas.microsoft.com/office/drawing/2014/main" xmlns="" id="{F8B8515F-9661-4402-8E77-E250565A924A}"/>
               </a:ext>
             </a:extLst>
           </p:cNvPr>
@@ -18371,7 +18378,7 @@
           <p:cNvPr id="5" name="Shape 616">
             <a:extLst>
               <a:ext uri="{FF2B5EF4-FFF2-40B4-BE49-F238E27FC236}">
-                <a16:creationId xmlns="" xmlns:a16="http://schemas.microsoft.com/office/drawing/2014/main" id="{9F48676B-3AC8-4773-A65C-CFA2D002C3DE}"/>
+                <a16:creationId xmlns:a16="http://schemas.microsoft.com/office/drawing/2014/main" xmlns="" id="{9F48676B-3AC8-4773-A65C-CFA2D002C3DE}"/>
               </a:ext>
             </a:extLst>
           </p:cNvPr>
@@ -18630,7 +18637,7 @@
           <p:cNvPr id="6" name="Shape 617">
             <a:extLst>
               <a:ext uri="{FF2B5EF4-FFF2-40B4-BE49-F238E27FC236}">
-                <a16:creationId xmlns="" xmlns:a16="http://schemas.microsoft.com/office/drawing/2014/main" id="{5D4E545D-D63B-466A-8E78-4136AD45B8B1}"/>
+                <a16:creationId xmlns:a16="http://schemas.microsoft.com/office/drawing/2014/main" xmlns="" id="{5D4E545D-D63B-466A-8E78-4136AD45B8B1}"/>
               </a:ext>
             </a:extLst>
           </p:cNvPr>
@@ -18880,7 +18887,7 @@
           <p:cNvPr id="7" name="Shape 618">
             <a:extLst>
               <a:ext uri="{FF2B5EF4-FFF2-40B4-BE49-F238E27FC236}">
-                <a16:creationId xmlns="" xmlns:a16="http://schemas.microsoft.com/office/drawing/2014/main" id="{C4FC960B-E20E-42D7-A772-A0E10F905B63}"/>
+                <a16:creationId xmlns:a16="http://schemas.microsoft.com/office/drawing/2014/main" xmlns="" id="{C4FC960B-E20E-42D7-A772-A0E10F905B63}"/>
               </a:ext>
             </a:extLst>
           </p:cNvPr>
@@ -19133,7 +19140,7 @@
           <p:cNvPr id="8" name="Shape 619">
             <a:extLst>
               <a:ext uri="{FF2B5EF4-FFF2-40B4-BE49-F238E27FC236}">
-                <a16:creationId xmlns="" xmlns:a16="http://schemas.microsoft.com/office/drawing/2014/main" id="{A2DB0845-9578-4EAE-8A4C-B86D6AFE72AE}"/>
+                <a16:creationId xmlns:a16="http://schemas.microsoft.com/office/drawing/2014/main" xmlns="" id="{A2DB0845-9578-4EAE-8A4C-B86D6AFE72AE}"/>
               </a:ext>
             </a:extLst>
           </p:cNvPr>
@@ -19392,7 +19399,7 @@
           <p:cNvPr id="9" name="Shape 620">
             <a:extLst>
               <a:ext uri="{FF2B5EF4-FFF2-40B4-BE49-F238E27FC236}">
-                <a16:creationId xmlns="" xmlns:a16="http://schemas.microsoft.com/office/drawing/2014/main" id="{3A988B9B-2D6A-4769-BB00-9D1F1FF7E361}"/>
+                <a16:creationId xmlns:a16="http://schemas.microsoft.com/office/drawing/2014/main" xmlns="" id="{3A988B9B-2D6A-4769-BB00-9D1F1FF7E361}"/>
               </a:ext>
             </a:extLst>
           </p:cNvPr>
@@ -19642,7 +19649,7 @@
           <p:cNvPr id="10" name="Shape 621">
             <a:extLst>
               <a:ext uri="{FF2B5EF4-FFF2-40B4-BE49-F238E27FC236}">
-                <a16:creationId xmlns="" xmlns:a16="http://schemas.microsoft.com/office/drawing/2014/main" id="{33C9952F-169A-4104-925E-45EFCDDAFBE4}"/>
+                <a16:creationId xmlns:a16="http://schemas.microsoft.com/office/drawing/2014/main" xmlns="" id="{33C9952F-169A-4104-925E-45EFCDDAFBE4}"/>
               </a:ext>
             </a:extLst>
           </p:cNvPr>
@@ -19895,7 +19902,7 @@
           <p:cNvPr id="11" name="Shape 622">
             <a:extLst>
               <a:ext uri="{FF2B5EF4-FFF2-40B4-BE49-F238E27FC236}">
-                <a16:creationId xmlns="" xmlns:a16="http://schemas.microsoft.com/office/drawing/2014/main" id="{F467EB5D-D5EB-45E0-9145-58A00B8A8182}"/>
+                <a16:creationId xmlns:a16="http://schemas.microsoft.com/office/drawing/2014/main" xmlns="" id="{F467EB5D-D5EB-45E0-9145-58A00B8A8182}"/>
               </a:ext>
             </a:extLst>
           </p:cNvPr>
@@ -20154,7 +20161,7 @@
           <p:cNvPr id="12" name="Shape 623">
             <a:extLst>
               <a:ext uri="{FF2B5EF4-FFF2-40B4-BE49-F238E27FC236}">
-                <a16:creationId xmlns="" xmlns:a16="http://schemas.microsoft.com/office/drawing/2014/main" id="{388717FA-57DF-472E-BC75-264D066376BB}"/>
+                <a16:creationId xmlns:a16="http://schemas.microsoft.com/office/drawing/2014/main" xmlns="" id="{388717FA-57DF-472E-BC75-264D066376BB}"/>
               </a:ext>
             </a:extLst>
           </p:cNvPr>
@@ -20404,7 +20411,7 @@
           <p:cNvPr id="13" name="Shape 625" descr="Paint Palette.png">
             <a:extLst>
               <a:ext uri="{FF2B5EF4-FFF2-40B4-BE49-F238E27FC236}">
-                <a16:creationId xmlns="" xmlns:a16="http://schemas.microsoft.com/office/drawing/2014/main" id="{B2F3E5B6-B379-453A-B36C-38A751AFD32C}"/>
+                <a16:creationId xmlns:a16="http://schemas.microsoft.com/office/drawing/2014/main" xmlns="" id="{B2F3E5B6-B379-453A-B36C-38A751AFD32C}"/>
               </a:ext>
             </a:extLst>
           </p:cNvPr>
@@ -20458,7 +20465,7 @@
           <p:cNvPr id="14" name="Shape 626" descr="Show Property.png">
             <a:extLst>
               <a:ext uri="{FF2B5EF4-FFF2-40B4-BE49-F238E27FC236}">
-                <a16:creationId xmlns="" xmlns:a16="http://schemas.microsoft.com/office/drawing/2014/main" id="{8F81A431-3651-4337-9E2F-01BBB7DF4C9D}"/>
+                <a16:creationId xmlns:a16="http://schemas.microsoft.com/office/drawing/2014/main" xmlns="" id="{8F81A431-3651-4337-9E2F-01BBB7DF4C9D}"/>
               </a:ext>
             </a:extLst>
           </p:cNvPr>
@@ -20498,7 +20505,7 @@
           <p:cNvPr id="15" name="Shape 627" descr="Recycling.png">
             <a:extLst>
               <a:ext uri="{FF2B5EF4-FFF2-40B4-BE49-F238E27FC236}">
-                <a16:creationId xmlns="" xmlns:a16="http://schemas.microsoft.com/office/drawing/2014/main" id="{3ED082D8-5EE1-4E80-9F65-AD74E93437E1}"/>
+                <a16:creationId xmlns:a16="http://schemas.microsoft.com/office/drawing/2014/main" xmlns="" id="{3ED082D8-5EE1-4E80-9F65-AD74E93437E1}"/>
               </a:ext>
             </a:extLst>
           </p:cNvPr>
@@ -20551,6 +20558,13 @@
       <p:transition/>
     </mc:Fallback>
   </mc:AlternateContent>
+  <p:timing>
+    <p:tnLst>
+      <p:par>
+        <p:cTn id="1" dur="indefinite" restart="never" nodeType="tmRoot"/>
+      </p:par>
+    </p:tnLst>
+  </p:timing>
 </p:sld>
 </file>
 
@@ -20599,7 +20613,7 @@
           <p:cNvPr id="4" name="Shape 232">
             <a:extLst>
               <a:ext uri="{FF2B5EF4-FFF2-40B4-BE49-F238E27FC236}">
-                <a16:creationId xmlns="" xmlns:a16="http://schemas.microsoft.com/office/drawing/2014/main" id="{57F8DA70-3CCF-44D8-921C-7D5AB851506E}"/>
+                <a16:creationId xmlns:a16="http://schemas.microsoft.com/office/drawing/2014/main" xmlns="" id="{57F8DA70-3CCF-44D8-921C-7D5AB851506E}"/>
               </a:ext>
             </a:extLst>
           </p:cNvPr>
@@ -21095,7 +21109,7 @@
                 <a:cs typeface="Calibri"/>
                 <a:sym typeface="Calibri"/>
               </a:rPr>
-              <a:t>configures</a:t>
+              <a:t>configured</a:t>
             </a:r>
             <a:r>
               <a:rPr lang="nl-NL" dirty="0" smtClean="0">
@@ -21896,6 +21910,13 @@
       <p:transition/>
     </mc:Fallback>
   </mc:AlternateContent>
+  <p:timing>
+    <p:tnLst>
+      <p:par>
+        <p:cTn id="1" dur="indefinite" restart="never" nodeType="tmRoot"/>
+      </p:par>
+    </p:tnLst>
+  </p:timing>
 </p:sld>
 </file>
 
@@ -21944,7 +21965,7 @@
           <p:cNvPr id="6" name="Shape 232">
             <a:extLst>
               <a:ext uri="{FF2B5EF4-FFF2-40B4-BE49-F238E27FC236}">
-                <a16:creationId xmlns="" xmlns:a16="http://schemas.microsoft.com/office/drawing/2014/main" id="{57F8DA70-3CCF-44D8-921C-7D5AB851506E}"/>
+                <a16:creationId xmlns:a16="http://schemas.microsoft.com/office/drawing/2014/main" xmlns="" id="{57F8DA70-3CCF-44D8-921C-7D5AB851506E}"/>
               </a:ext>
             </a:extLst>
           </p:cNvPr>
@@ -22456,7 +22477,7 @@
                 <a:cs typeface="Calibri"/>
                 <a:sym typeface="Calibri"/>
               </a:rPr>
-              <a:t>configures</a:t>
+              <a:t>configured</a:t>
             </a:r>
             <a:r>
               <a:rPr lang="nl-NL" dirty="0" smtClean="0">
@@ -23106,6 +23127,13 @@
       <p:transition/>
     </mc:Fallback>
   </mc:AlternateContent>
+  <p:timing>
+    <p:tnLst>
+      <p:par>
+        <p:cTn id="1" dur="indefinite" restart="never" nodeType="tmRoot"/>
+      </p:par>
+    </p:tnLst>
+  </p:timing>
 </p:sld>
 </file>
 
@@ -23158,7 +23186,7 @@
           <p:cNvPr id="9" name="Shape 232">
             <a:extLst>
               <a:ext uri="{FF2B5EF4-FFF2-40B4-BE49-F238E27FC236}">
-                <a16:creationId xmlns="" xmlns:a16="http://schemas.microsoft.com/office/drawing/2014/main" id="{57F8DA70-3CCF-44D8-921C-7D5AB851506E}"/>
+                <a16:creationId xmlns:a16="http://schemas.microsoft.com/office/drawing/2014/main" xmlns="" id="{57F8DA70-3CCF-44D8-921C-7D5AB851506E}"/>
               </a:ext>
             </a:extLst>
           </p:cNvPr>
@@ -23670,6 +23698,13 @@
       <p:transition/>
     </mc:Fallback>
   </mc:AlternateContent>
+  <p:timing>
+    <p:tnLst>
+      <p:par>
+        <p:cTn id="1" dur="indefinite" restart="never" nodeType="tmRoot"/>
+      </p:par>
+    </p:tnLst>
+  </p:timing>
 </p:sld>
 </file>
 
@@ -23718,7 +23753,7 @@
           <p:cNvPr id="4" name="Shape 232">
             <a:extLst>
               <a:ext uri="{FF2B5EF4-FFF2-40B4-BE49-F238E27FC236}">
-                <a16:creationId xmlns="" xmlns:a16="http://schemas.microsoft.com/office/drawing/2014/main" id="{57F8DA70-3CCF-44D8-921C-7D5AB851506E}"/>
+                <a16:creationId xmlns:a16="http://schemas.microsoft.com/office/drawing/2014/main" xmlns="" id="{57F8DA70-3CCF-44D8-921C-7D5AB851506E}"/>
               </a:ext>
             </a:extLst>
           </p:cNvPr>
@@ -24787,6 +24822,13 @@
       <p:transition/>
     </mc:Fallback>
   </mc:AlternateContent>
+  <p:timing>
+    <p:tnLst>
+      <p:par>
+        <p:cTn id="1" dur="indefinite" restart="never" nodeType="tmRoot"/>
+      </p:par>
+    </p:tnLst>
+  </p:timing>
 </p:sld>
 </file>
 
@@ -25323,7 +25365,7 @@
           <p:cNvPr id="6" name="Shape 232">
             <a:extLst>
               <a:ext uri="{FF2B5EF4-FFF2-40B4-BE49-F238E27FC236}">
-                <a16:creationId xmlns="" xmlns:a16="http://schemas.microsoft.com/office/drawing/2014/main" id="{647DCD03-8F8E-4AE6-B694-8E897929AEAB}"/>
+                <a16:creationId xmlns:a16="http://schemas.microsoft.com/office/drawing/2014/main" xmlns="" id="{647DCD03-8F8E-4AE6-B694-8E897929AEAB}"/>
               </a:ext>
             </a:extLst>
           </p:cNvPr>
@@ -25707,7 +25749,7 @@
           <p:cNvPr id="7" name="TextBox 6">
             <a:extLst>
               <a:ext uri="{FF2B5EF4-FFF2-40B4-BE49-F238E27FC236}">
-                <a16:creationId xmlns="" xmlns:a16="http://schemas.microsoft.com/office/drawing/2014/main" id="{D5CB55EE-2234-40E6-BCCE-F02B3A98BC7C}"/>
+                <a16:creationId xmlns:a16="http://schemas.microsoft.com/office/drawing/2014/main" xmlns="" id="{D5CB55EE-2234-40E6-BCCE-F02B3A98BC7C}"/>
               </a:ext>
             </a:extLst>
           </p:cNvPr>
@@ -25810,7 +25852,7 @@
           <p:cNvPr id="8" name="Picture 7" descr="Download.png">
             <a:extLst>
               <a:ext uri="{FF2B5EF4-FFF2-40B4-BE49-F238E27FC236}">
-                <a16:creationId xmlns="" xmlns:a16="http://schemas.microsoft.com/office/drawing/2014/main" id="{60638D2C-7F1E-48D9-BEE8-924CED878CF8}"/>
+                <a16:creationId xmlns:a16="http://schemas.microsoft.com/office/drawing/2014/main" xmlns="" id="{60638D2C-7F1E-48D9-BEE8-924CED878CF8}"/>
               </a:ext>
             </a:extLst>
           </p:cNvPr>
@@ -25871,6 +25913,13 @@
       <p:transition/>
     </mc:Fallback>
   </mc:AlternateContent>
+  <p:timing>
+    <p:tnLst>
+      <p:par>
+        <p:cTn id="1" dur="indefinite" restart="never" nodeType="tmRoot"/>
+      </p:par>
+    </p:tnLst>
+  </p:timing>
 </p:sld>
 </file>
 
@@ -25896,7 +25945,7 @@
           <p:cNvPr id="9" name="Shape 655">
             <a:extLst>
               <a:ext uri="{FF2B5EF4-FFF2-40B4-BE49-F238E27FC236}">
-                <a16:creationId xmlns="" xmlns:a16="http://schemas.microsoft.com/office/drawing/2014/main" id="{7D3B66E4-CAA6-42DF-9CBB-2069FD866E95}"/>
+                <a16:creationId xmlns:a16="http://schemas.microsoft.com/office/drawing/2014/main" xmlns="" id="{7D3B66E4-CAA6-42DF-9CBB-2069FD866E95}"/>
               </a:ext>
             </a:extLst>
           </p:cNvPr>
@@ -26149,7 +26198,7 @@
           <p:cNvPr id="10" name="Shape 657">
             <a:extLst>
               <a:ext uri="{FF2B5EF4-FFF2-40B4-BE49-F238E27FC236}">
-                <a16:creationId xmlns="" xmlns:a16="http://schemas.microsoft.com/office/drawing/2014/main" id="{C08E844C-0ED0-4535-AF34-FDBA6ECBE0BE}"/>
+                <a16:creationId xmlns:a16="http://schemas.microsoft.com/office/drawing/2014/main" xmlns="" id="{C08E844C-0ED0-4535-AF34-FDBA6ECBE0BE}"/>
               </a:ext>
             </a:extLst>
           </p:cNvPr>
@@ -27395,6 +27444,13 @@
       <p:transition/>
     </mc:Fallback>
   </mc:AlternateContent>
+  <p:timing>
+    <p:tnLst>
+      <p:par>
+        <p:cTn id="1" dur="indefinite" restart="never" nodeType="tmRoot"/>
+      </p:par>
+    </p:tnLst>
+  </p:timing>
 </p:sld>
 </file>
 
@@ -27465,6 +27521,21 @@
   <p:clrMapOvr>
     <a:masterClrMapping/>
   </p:clrMapOvr>
+  <mc:AlternateContent xmlns:mc="http://schemas.openxmlformats.org/markup-compatibility/2006">
+    <mc:Choice xmlns:p14="http://schemas.microsoft.com/office/powerpoint/2010/main" Requires="p14">
+      <p:transition p14:dur="0"/>
+    </mc:Choice>
+    <mc:Fallback>
+      <p:transition/>
+    </mc:Fallback>
+  </mc:AlternateContent>
+  <p:timing>
+    <p:tnLst>
+      <p:par>
+        <p:cTn id="1" dur="indefinite" restart="never" nodeType="tmRoot"/>
+      </p:par>
+    </p:tnLst>
+  </p:timing>
 </p:sld>
 </file>
 
@@ -27721,7 +27792,16 @@
                 <a:cs typeface="Roboto"/>
                 <a:sym typeface="Roboto"/>
               </a:rPr>
-              <a:t>Benefits </a:t>
+              <a:t>Benefits of </a:t>
+            </a:r>
+            <a:r>
+              <a:rPr lang="en-US" dirty="0" err="1" smtClean="0">
+                <a:latin typeface="Roboto"/>
+                <a:ea typeface="Roboto"/>
+                <a:cs typeface="Roboto"/>
+                <a:sym typeface="Roboto"/>
+              </a:rPr>
+              <a:t>Xamarin</a:t>
             </a:r>
             <a:r>
               <a:rPr lang="en-US" dirty="0" smtClean="0">
@@ -27730,34 +27810,7 @@
                 <a:cs typeface="Roboto"/>
                 <a:sym typeface="Roboto"/>
               </a:rPr>
-              <a:t>of </a:t>
-            </a:r>
-            <a:r>
-              <a:rPr lang="en-US" dirty="0" smtClean="0">
-                <a:latin typeface="Roboto"/>
-                <a:ea typeface="Roboto"/>
-                <a:cs typeface="Roboto"/>
-                <a:sym typeface="Roboto"/>
-              </a:rPr>
-              <a:t>the traditional </a:t>
-            </a:r>
-            <a:r>
-              <a:rPr lang="en-US" dirty="0" err="1" smtClean="0">
-                <a:latin typeface="Roboto"/>
-                <a:ea typeface="Roboto"/>
-                <a:cs typeface="Roboto"/>
-                <a:sym typeface="Roboto"/>
-              </a:rPr>
-              <a:t>Xamarin</a:t>
-            </a:r>
-            <a:r>
-              <a:rPr lang="en-US" dirty="0" smtClean="0">
-                <a:latin typeface="Roboto"/>
-                <a:ea typeface="Roboto"/>
-                <a:cs typeface="Roboto"/>
-                <a:sym typeface="Roboto"/>
-              </a:rPr>
-              <a:t> approach</a:t>
+              <a:t> Native</a:t>
             </a:r>
             <a:endParaRPr lang="en-US" dirty="0">
               <a:latin typeface="Roboto"/>
@@ -27982,6 +28035,13 @@
       <p:transition/>
     </mc:Fallback>
   </mc:AlternateContent>
+  <p:timing>
+    <p:tnLst>
+      <p:par>
+        <p:cTn id="1" dur="indefinite" restart="never" nodeType="tmRoot"/>
+      </p:par>
+    </p:tnLst>
+  </p:timing>
 </p:sld>
 </file>
 
@@ -28179,6 +28239,13 @@
       <p:transition/>
     </mc:Fallback>
   </mc:AlternateContent>
+  <p:timing>
+    <p:tnLst>
+      <p:par>
+        <p:cTn id="1" dur="indefinite" restart="never" nodeType="tmRoot"/>
+      </p:par>
+    </p:tnLst>
+  </p:timing>
 </p:sld>
 </file>
 
@@ -28425,7 +28492,7 @@
               <a:buNone/>
             </a:pPr>
             <a:r>
-              <a:rPr lang="nl" sz="3500" dirty="0">
+              <a:rPr lang="nl" sz="3500" dirty="0" smtClean="0">
                 <a:solidFill>
                   <a:srgbClr val="1C6FB8"/>
                 </a:solidFill>
@@ -28434,7 +28501,67 @@
                 <a:cs typeface="Roboto Slab"/>
                 <a:sym typeface="Roboto Slab"/>
               </a:rPr>
-              <a:t>Xamarin + Xamarin.Forms</a:t>
+              <a:t>Xamarin</a:t>
+            </a:r>
+            <a:r>
+              <a:rPr lang="en-US" sz="3500" dirty="0" smtClean="0">
+                <a:solidFill>
+                  <a:srgbClr val="1C6FB8"/>
+                </a:solidFill>
+                <a:latin typeface="Roboto Slab"/>
+                <a:ea typeface="Roboto Slab"/>
+                <a:cs typeface="Roboto Slab"/>
+                <a:sym typeface="Roboto Slab"/>
+              </a:rPr>
+              <a:t> Native</a:t>
+            </a:r>
+            <a:r>
+              <a:rPr lang="nl" sz="3500" dirty="0" smtClean="0">
+                <a:solidFill>
+                  <a:srgbClr val="1C6FB8"/>
+                </a:solidFill>
+                <a:latin typeface="Roboto Slab"/>
+                <a:ea typeface="Roboto Slab"/>
+                <a:cs typeface="Roboto Slab"/>
+                <a:sym typeface="Roboto Slab"/>
+              </a:rPr>
+              <a:t> </a:t>
+            </a:r>
+            <a:r>
+              <a:rPr lang="en-US" sz="3500" dirty="0">
+                <a:solidFill>
+                  <a:srgbClr val="1C6FB8"/>
+                </a:solidFill>
+                <a:latin typeface="Roboto Slab"/>
+                <a:ea typeface="Roboto Slab"/>
+                <a:cs typeface="Roboto Slab"/>
+                <a:sym typeface="Roboto Slab"/>
+              </a:rPr>
+              <a:t>&amp;</a:t>
+            </a:r>
+            <a:r>
+              <a:rPr lang="nl" sz="3500" dirty="0" smtClean="0">
+                <a:solidFill>
+                  <a:srgbClr val="1C6FB8"/>
+                </a:solidFill>
+                <a:latin typeface="Roboto Slab"/>
+                <a:ea typeface="Roboto Slab"/>
+                <a:cs typeface="Roboto Slab"/>
+                <a:sym typeface="Roboto Slab"/>
+              </a:rPr>
+              <a:t> </a:t>
+            </a:r>
+            <a:r>
+              <a:rPr lang="nl" sz="3500" dirty="0">
+                <a:solidFill>
+                  <a:srgbClr val="1C6FB8"/>
+                </a:solidFill>
+                <a:latin typeface="Roboto Slab"/>
+                <a:ea typeface="Roboto Slab"/>
+                <a:cs typeface="Roboto Slab"/>
+                <a:sym typeface="Roboto Slab"/>
+              </a:rPr>
+              <a:t>Xamarin.Forms</a:t>
             </a:r>
           </a:p>
           <a:p>
@@ -30398,7 +30525,11 @@
             </a:r>
             <a:r>
               <a:rPr lang="en-US" dirty="0" smtClean="0"/>
-              <a:t> traditional approach</a:t>
+              <a:t> </a:t>
+            </a:r>
+            <a:r>
+              <a:rPr lang="en-US" dirty="0" smtClean="0"/>
+              <a:t>Native</a:t>
             </a:r>
             <a:endParaRPr lang="en-US" dirty="0"/>
           </a:p>
@@ -30950,7 +31081,7 @@
           <p:cNvPr id="3" name="Shape 244">
             <a:extLst>
               <a:ext uri="{FF2B5EF4-FFF2-40B4-BE49-F238E27FC236}">
-                <a16:creationId xmlns="" xmlns:a16="http://schemas.microsoft.com/office/drawing/2014/main" id="{ACDAC6D0-0575-487B-AA88-09B89B48E603}"/>
+                <a16:creationId xmlns:a16="http://schemas.microsoft.com/office/drawing/2014/main" xmlns="" id="{ACDAC6D0-0575-487B-AA88-09B89B48E603}"/>
               </a:ext>
             </a:extLst>
           </p:cNvPr>
@@ -31017,7 +31148,7 @@
           <p:cNvPr id="4" name="Shape 245">
             <a:extLst>
               <a:ext uri="{FF2B5EF4-FFF2-40B4-BE49-F238E27FC236}">
-                <a16:creationId xmlns="" xmlns:a16="http://schemas.microsoft.com/office/drawing/2014/main" id="{8104BA15-1A31-418A-B1CD-A85C7E4AF25A}"/>
+                <a16:creationId xmlns:a16="http://schemas.microsoft.com/office/drawing/2014/main" xmlns="" id="{8104BA15-1A31-418A-B1CD-A85C7E4AF25A}"/>
               </a:ext>
             </a:extLst>
           </p:cNvPr>
@@ -31103,7 +31234,7 @@
           <p:cNvPr id="5" name="Shape 246">
             <a:extLst>
               <a:ext uri="{FF2B5EF4-FFF2-40B4-BE49-F238E27FC236}">
-                <a16:creationId xmlns="" xmlns:a16="http://schemas.microsoft.com/office/drawing/2014/main" id="{F77C77D9-23C8-4027-A08A-C3BF6E7FF284}"/>
+                <a16:creationId xmlns:a16="http://schemas.microsoft.com/office/drawing/2014/main" xmlns="" id="{F77C77D9-23C8-4027-A08A-C3BF6E7FF284}"/>
               </a:ext>
             </a:extLst>
           </p:cNvPr>
@@ -31170,7 +31301,7 @@
           <p:cNvPr id="6" name="Shape 247">
             <a:extLst>
               <a:ext uri="{FF2B5EF4-FFF2-40B4-BE49-F238E27FC236}">
-                <a16:creationId xmlns="" xmlns:a16="http://schemas.microsoft.com/office/drawing/2014/main" id="{F3E22077-291E-4036-8152-9E8CC13A2DD1}"/>
+                <a16:creationId xmlns:a16="http://schemas.microsoft.com/office/drawing/2014/main" xmlns="" id="{F3E22077-291E-4036-8152-9E8CC13A2DD1}"/>
               </a:ext>
             </a:extLst>
           </p:cNvPr>
@@ -31205,7 +31336,7 @@
           <p:cNvPr id="7" name="Shape 248">
             <a:extLst>
               <a:ext uri="{FF2B5EF4-FFF2-40B4-BE49-F238E27FC236}">
-                <a16:creationId xmlns="" xmlns:a16="http://schemas.microsoft.com/office/drawing/2014/main" id="{A8F19181-70B5-4D08-945D-175213300455}"/>
+                <a16:creationId xmlns:a16="http://schemas.microsoft.com/office/drawing/2014/main" xmlns="" id="{A8F19181-70B5-4D08-945D-175213300455}"/>
               </a:ext>
             </a:extLst>
           </p:cNvPr>
@@ -31239,7 +31370,7 @@
           <p:cNvPr id="8" name="Shape 249">
             <a:extLst>
               <a:ext uri="{FF2B5EF4-FFF2-40B4-BE49-F238E27FC236}">
-                <a16:creationId xmlns="" xmlns:a16="http://schemas.microsoft.com/office/drawing/2014/main" id="{71A58D54-9904-4766-AE05-90F7C538526B}"/>
+                <a16:creationId xmlns:a16="http://schemas.microsoft.com/office/drawing/2014/main" xmlns="" id="{71A58D54-9904-4766-AE05-90F7C538526B}"/>
               </a:ext>
             </a:extLst>
           </p:cNvPr>
@@ -31273,7 +31404,7 @@
           <p:cNvPr id="9" name="Shape 250">
             <a:extLst>
               <a:ext uri="{FF2B5EF4-FFF2-40B4-BE49-F238E27FC236}">
-                <a16:creationId xmlns="" xmlns:a16="http://schemas.microsoft.com/office/drawing/2014/main" id="{E5F85E10-5BC1-468D-8D42-81B3A8A2C87F}"/>
+                <a16:creationId xmlns:a16="http://schemas.microsoft.com/office/drawing/2014/main" xmlns="" id="{E5F85E10-5BC1-468D-8D42-81B3A8A2C87F}"/>
               </a:ext>
             </a:extLst>
           </p:cNvPr>
@@ -31330,7 +31461,7 @@
           <p:cNvPr id="10" name="Left Brace 9">
             <a:extLst>
               <a:ext uri="{FF2B5EF4-FFF2-40B4-BE49-F238E27FC236}">
-                <a16:creationId xmlns="" xmlns:a16="http://schemas.microsoft.com/office/drawing/2014/main" id="{B135C5BC-DB6C-4416-BD9A-27578C7A6AE6}"/>
+                <a16:creationId xmlns:a16="http://schemas.microsoft.com/office/drawing/2014/main" xmlns="" id="{B135C5BC-DB6C-4416-BD9A-27578C7A6AE6}"/>
               </a:ext>
             </a:extLst>
           </p:cNvPr>
@@ -31385,7 +31516,7 @@
           <p:cNvPr id="11" name="TextBox 10">
             <a:extLst>
               <a:ext uri="{FF2B5EF4-FFF2-40B4-BE49-F238E27FC236}">
-                <a16:creationId xmlns="" xmlns:a16="http://schemas.microsoft.com/office/drawing/2014/main" id="{47687623-445E-447F-B795-C8AF87CDF677}"/>
+                <a16:creationId xmlns:a16="http://schemas.microsoft.com/office/drawing/2014/main" xmlns="" id="{47687623-445E-447F-B795-C8AF87CDF677}"/>
               </a:ext>
             </a:extLst>
           </p:cNvPr>
@@ -31457,7 +31588,7 @@
           <p:cNvPr id="12" name="TextBox 11">
             <a:extLst>
               <a:ext uri="{FF2B5EF4-FFF2-40B4-BE49-F238E27FC236}">
-                <a16:creationId xmlns="" xmlns:a16="http://schemas.microsoft.com/office/drawing/2014/main" id="{3AA7792B-34D6-4515-8C31-879174E8806F}"/>
+                <a16:creationId xmlns:a16="http://schemas.microsoft.com/office/drawing/2014/main" xmlns="" id="{3AA7792B-34D6-4515-8C31-879174E8806F}"/>
               </a:ext>
             </a:extLst>
           </p:cNvPr>
@@ -31529,7 +31660,7 @@
           <p:cNvPr id="13" name="Left Brace 12">
             <a:extLst>
               <a:ext uri="{FF2B5EF4-FFF2-40B4-BE49-F238E27FC236}">
-                <a16:creationId xmlns="" xmlns:a16="http://schemas.microsoft.com/office/drawing/2014/main" id="{38A7FF60-E674-4C1A-9E5D-C73B12D25109}"/>
+                <a16:creationId xmlns:a16="http://schemas.microsoft.com/office/drawing/2014/main" xmlns="" id="{38A7FF60-E674-4C1A-9E5D-C73B12D25109}"/>
               </a:ext>
             </a:extLst>
           </p:cNvPr>
@@ -31584,7 +31715,7 @@
           <p:cNvPr id="14" name="TextBox 13">
             <a:extLst>
               <a:ext uri="{FF2B5EF4-FFF2-40B4-BE49-F238E27FC236}">
-                <a16:creationId xmlns="" xmlns:a16="http://schemas.microsoft.com/office/drawing/2014/main" id="{D846A2CE-FC63-4C53-900B-EA423A67726E}"/>
+                <a16:creationId xmlns:a16="http://schemas.microsoft.com/office/drawing/2014/main" xmlns="" id="{D846A2CE-FC63-4C53-900B-EA423A67726E}"/>
               </a:ext>
             </a:extLst>
           </p:cNvPr>

</xml_diff>

<commit_message>
Added sheet on Xamarin Training
</commit_message>
<xml_diff>
--- a/Building Native Designed App with Xamarin and MvvmCross.pptx
+++ b/Building Native Designed App with Xamarin and MvvmCross.pptx
@@ -6,7 +6,7 @@
     <p:sldMasterId id="2147483702" r:id="rId2"/>
   </p:sldMasterIdLst>
   <p:notesMasterIdLst>
-    <p:notesMasterId r:id="rId26"/>
+    <p:notesMasterId r:id="rId27"/>
   </p:notesMasterIdLst>
   <p:sldIdLst>
     <p:sldId id="256" r:id="rId3"/>
@@ -30,8 +30,9 @@
     <p:sldId id="326" r:id="rId21"/>
     <p:sldId id="327" r:id="rId22"/>
     <p:sldId id="317" r:id="rId23"/>
-    <p:sldId id="331" r:id="rId24"/>
-    <p:sldId id="329" r:id="rId25"/>
+    <p:sldId id="338" r:id="rId24"/>
+    <p:sldId id="331" r:id="rId25"/>
+    <p:sldId id="329" r:id="rId26"/>
   </p:sldIdLst>
   <p:sldSz cx="9144000" cy="5143500" type="screen16x9"/>
   <p:notesSz cx="6858000" cy="9144000"/>
@@ -3452,6 +3453,72 @@
 </file>
 
 <file path=ppt/notesSlides/notesSlide8.xml><?xml version="1.0" encoding="utf-8"?>
+<p:notes xmlns:a="http://schemas.openxmlformats.org/drawingml/2006/main" xmlns:r="http://schemas.openxmlformats.org/officeDocument/2006/relationships" xmlns:p="http://schemas.openxmlformats.org/presentationml/2006/main">
+  <p:cSld>
+    <p:spTree>
+      <p:nvGrpSpPr>
+        <p:cNvPr id="1" name=""/>
+        <p:cNvGrpSpPr/>
+        <p:nvPr/>
+      </p:nvGrpSpPr>
+      <p:grpSpPr>
+        <a:xfrm>
+          <a:off x="0" y="0"/>
+          <a:ext cx="0" cy="0"/>
+          <a:chOff x="0" y="0"/>
+          <a:chExt cx="0" cy="0"/>
+        </a:xfrm>
+      </p:grpSpPr>
+      <p:sp>
+        <p:nvSpPr>
+          <p:cNvPr id="2" name="Slide Image Placeholder 1"/>
+          <p:cNvSpPr>
+            <a:spLocks noGrp="1" noRot="1" noChangeAspect="1"/>
+          </p:cNvSpPr>
+          <p:nvPr>
+            <p:ph type="sldImg"/>
+          </p:nvPr>
+        </p:nvSpPr>
+        <p:spPr>
+          <a:xfrm>
+            <a:off x="381000" y="685800"/>
+            <a:ext cx="6096000" cy="3429000"/>
+          </a:xfrm>
+        </p:spPr>
+      </p:sp>
+      <p:sp>
+        <p:nvSpPr>
+          <p:cNvPr id="3" name="Notes Placeholder 2"/>
+          <p:cNvSpPr>
+            <a:spLocks noGrp="1"/>
+          </p:cNvSpPr>
+          <p:nvPr>
+            <p:ph type="body" idx="1"/>
+          </p:nvPr>
+        </p:nvSpPr>
+        <p:spPr/>
+        <p:txBody>
+          <a:bodyPr/>
+          <a:lstStyle/>
+          <a:p>
+            <a:endParaRPr lang="en-US" dirty="0"/>
+          </a:p>
+        </p:txBody>
+      </p:sp>
+    </p:spTree>
+    <p:extLst>
+      <p:ext uri="{BB962C8B-B14F-4D97-AF65-F5344CB8AC3E}">
+        <p14:creationId xmlns:p14="http://schemas.microsoft.com/office/powerpoint/2010/main" val="1128884930"/>
+      </p:ext>
+    </p:extLst>
+  </p:cSld>
+  <p:clrMapOvr>
+    <a:masterClrMapping/>
+  </p:clrMapOvr>
+</p:notes>
+</file>
+
+<file path=ppt/notesSlides/notesSlide9.xml><?xml version="1.0" encoding="utf-8"?>
 <p:notes xmlns:a="http://schemas.openxmlformats.org/drawingml/2006/main" xmlns:r="http://schemas.openxmlformats.org/officeDocument/2006/relationships" xmlns:p="http://schemas.openxmlformats.org/presentationml/2006/main" showMasterSp="0" showMasterPhAnim="0">
   <p:cSld>
     <p:spTree>
@@ -26179,7 +26246,7 @@
               <a:buNone/>
             </a:pPr>
             <a:r>
-              <a:rPr lang="en-GB" sz="6000" b="1">
+              <a:rPr lang="en-GB" sz="6000" b="1" dirty="0">
                 <a:solidFill>
                   <a:srgbClr val="FFFFFF"/>
                 </a:solidFill>
@@ -26227,6 +26294,121 @@
           </a:ln>
         </p:spPr>
       </p:pic>
+      <p:sp>
+        <p:nvSpPr>
+          <p:cNvPr id="4" name="Shape 226"/>
+          <p:cNvSpPr txBox="1"/>
+          <p:nvPr/>
+        </p:nvSpPr>
+        <p:spPr>
+          <a:xfrm>
+            <a:off x="437547" y="4050000"/>
+            <a:ext cx="6952488" cy="564600"/>
+          </a:xfrm>
+          <a:prstGeom prst="rect">
+            <a:avLst/>
+          </a:prstGeom>
+          <a:noFill/>
+          <a:ln>
+            <a:noFill/>
+          </a:ln>
+        </p:spPr>
+        <p:txBody>
+          <a:bodyPr wrap="square" lIns="91425" tIns="91425" rIns="91425" bIns="91425" anchor="ctr" anchorCtr="0">
+            <a:noAutofit/>
+          </a:bodyPr>
+          <a:lstStyle/>
+          <a:p>
+            <a:pPr lvl="0" rtl="0">
+              <a:spcBef>
+                <a:spcPts val="0"/>
+              </a:spcBef>
+              <a:buNone/>
+            </a:pPr>
+            <a:r>
+              <a:rPr lang="en-US" sz="1600" dirty="0" smtClean="0">
+                <a:solidFill>
+                  <a:schemeClr val="bg1"/>
+                </a:solidFill>
+                <a:latin typeface="Roboto" charset="0"/>
+                <a:ea typeface="Roboto" charset="0"/>
+                <a:cs typeface="Roboto" charset="0"/>
+                <a:sym typeface="Montserrat"/>
+              </a:rPr>
+              <a:t>Code available at: </a:t>
+            </a:r>
+            <a:r>
+              <a:rPr lang="en-US" sz="1600" b="1" u="sng" dirty="0" smtClean="0">
+                <a:solidFill>
+                  <a:schemeClr val="bg1"/>
+                </a:solidFill>
+                <a:latin typeface="Roboto" charset="0"/>
+                <a:ea typeface="Roboto" charset="0"/>
+                <a:cs typeface="Roboto" charset="0"/>
+                <a:sym typeface="Montserrat"/>
+              </a:rPr>
+              <a:t>https://</a:t>
+            </a:r>
+            <a:r>
+              <a:rPr lang="en-US" sz="1600" b="1" u="sng" dirty="0" err="1" smtClean="0">
+                <a:solidFill>
+                  <a:schemeClr val="bg1"/>
+                </a:solidFill>
+                <a:latin typeface="Roboto" charset="0"/>
+                <a:ea typeface="Roboto" charset="0"/>
+                <a:cs typeface="Roboto" charset="0"/>
+                <a:sym typeface="Montserrat"/>
+              </a:rPr>
+              <a:t>github.com</a:t>
+            </a:r>
+            <a:r>
+              <a:rPr lang="en-US" sz="1600" b="1" u="sng" dirty="0" smtClean="0">
+                <a:solidFill>
+                  <a:schemeClr val="bg1"/>
+                </a:solidFill>
+                <a:latin typeface="Roboto" charset="0"/>
+                <a:ea typeface="Roboto" charset="0"/>
+                <a:cs typeface="Roboto" charset="0"/>
+                <a:sym typeface="Montserrat"/>
+              </a:rPr>
+              <a:t>/</a:t>
+            </a:r>
+            <a:r>
+              <a:rPr lang="en-US" sz="1600" b="1" u="sng" dirty="0" err="1" smtClean="0">
+                <a:solidFill>
+                  <a:schemeClr val="bg1"/>
+                </a:solidFill>
+                <a:latin typeface="Roboto" charset="0"/>
+                <a:ea typeface="Roboto" charset="0"/>
+                <a:cs typeface="Roboto" charset="0"/>
+                <a:sym typeface="Montserrat"/>
+              </a:rPr>
+              <a:t>Xablu</a:t>
+            </a:r>
+            <a:r>
+              <a:rPr lang="en-US" sz="1600" b="1" u="sng" dirty="0" smtClean="0">
+                <a:solidFill>
+                  <a:schemeClr val="bg1"/>
+                </a:solidFill>
+                <a:latin typeface="Roboto" charset="0"/>
+                <a:ea typeface="Roboto" charset="0"/>
+                <a:cs typeface="Roboto" charset="0"/>
+                <a:sym typeface="Montserrat"/>
+              </a:rPr>
+              <a:t>/TechDays2017</a:t>
+            </a:r>
+            <a:endParaRPr lang="nl" sz="1600" b="1" u="sng" dirty="0">
+              <a:solidFill>
+                <a:schemeClr val="bg1"/>
+              </a:solidFill>
+              <a:latin typeface="Roboto" charset="0"/>
+              <a:ea typeface="Roboto" charset="0"/>
+              <a:cs typeface="Roboto" charset="0"/>
+              <a:sym typeface="Montserrat"/>
+            </a:endParaRPr>
+          </a:p>
+        </p:txBody>
+      </p:sp>
     </p:spTree>
     <p:extLst>
       <p:ext uri="{BB962C8B-B14F-4D97-AF65-F5344CB8AC3E}">
@@ -26256,6 +26438,593 @@
 </file>
 
 <file path=ppt/slides/slide22.xml><?xml version="1.0" encoding="utf-8"?>
+<p:sld xmlns:a="http://schemas.openxmlformats.org/drawingml/2006/main" xmlns:r="http://schemas.openxmlformats.org/officeDocument/2006/relationships" xmlns:p="http://schemas.openxmlformats.org/presentationml/2006/main">
+  <p:cSld>
+    <p:spTree>
+      <p:nvGrpSpPr>
+        <p:cNvPr id="1" name=""/>
+        <p:cNvGrpSpPr/>
+        <p:nvPr/>
+      </p:nvGrpSpPr>
+      <p:grpSpPr>
+        <a:xfrm>
+          <a:off x="0" y="0"/>
+          <a:ext cx="0" cy="0"/>
+          <a:chOff x="0" y="0"/>
+          <a:chExt cx="0" cy="0"/>
+        </a:xfrm>
+      </p:grpSpPr>
+      <p:sp>
+        <p:nvSpPr>
+          <p:cNvPr id="2" name="Title 1"/>
+          <p:cNvSpPr>
+            <a:spLocks noGrp="1"/>
+          </p:cNvSpPr>
+          <p:nvPr>
+            <p:ph type="title"/>
+          </p:nvPr>
+        </p:nvSpPr>
+        <p:spPr/>
+        <p:txBody>
+          <a:bodyPr/>
+          <a:lstStyle/>
+          <a:p>
+            <a:r>
+              <a:rPr lang="en-US" dirty="0" err="1" smtClean="0"/>
+              <a:t>Xablu</a:t>
+            </a:r>
+            <a:r>
+              <a:rPr lang="en-US" dirty="0" smtClean="0"/>
+              <a:t> training program</a:t>
+            </a:r>
+            <a:endParaRPr lang="en-US" dirty="0"/>
+          </a:p>
+        </p:txBody>
+      </p:sp>
+      <p:sp>
+        <p:nvSpPr>
+          <p:cNvPr id="11" name="Shape 232">
+            <a:extLst>
+              <a:ext uri="{FF2B5EF4-FFF2-40B4-BE49-F238E27FC236}">
+                <a16:creationId xmlns="" xmlns:a16="http://schemas.microsoft.com/office/drawing/2014/main" id="{647DCD03-8F8E-4AE6-B694-8E897929AEAB}"/>
+              </a:ext>
+            </a:extLst>
+          </p:cNvPr>
+          <p:cNvSpPr txBox="1"/>
+          <p:nvPr/>
+        </p:nvSpPr>
+        <p:spPr>
+          <a:xfrm>
+            <a:off x="311700" y="1264778"/>
+            <a:ext cx="8520600" cy="3443955"/>
+          </a:xfrm>
+          <a:prstGeom prst="rect">
+            <a:avLst/>
+          </a:prstGeom>
+          <a:noFill/>
+          <a:ln>
+            <a:noFill/>
+          </a:ln>
+        </p:spPr>
+        <p:txBody>
+          <a:bodyPr wrap="square" lIns="91425" tIns="91425" rIns="91425" bIns="91425" anchor="t" anchorCtr="0">
+            <a:noAutofit/>
+          </a:bodyPr>
+          <a:lstStyle/>
+          <a:p>
+            <a:pPr marL="114300" lvl="0" rtl="0">
+              <a:spcBef>
+                <a:spcPts val="0"/>
+              </a:spcBef>
+              <a:buClr>
+                <a:srgbClr val="FFFFFF"/>
+              </a:buClr>
+              <a:buSzPct val="100000"/>
+            </a:pPr>
+            <a:r>
+              <a:rPr lang="en-US" sz="1800" dirty="0" smtClean="0">
+                <a:solidFill>
+                  <a:schemeClr val="bg2"/>
+                </a:solidFill>
+                <a:latin typeface="Roboto" panose="020B0604020202020204" charset="0"/>
+                <a:ea typeface="Roboto" panose="020B0604020202020204" charset="0"/>
+                <a:cs typeface="Calibri"/>
+                <a:sym typeface="Calibri"/>
+              </a:rPr>
+              <a:t>With our partner Global Knowledge we provide </a:t>
+            </a:r>
+            <a:r>
+              <a:rPr lang="en-US" sz="1800" dirty="0" err="1" smtClean="0">
+                <a:solidFill>
+                  <a:schemeClr val="bg2"/>
+                </a:solidFill>
+                <a:latin typeface="Roboto" panose="020B0604020202020204" charset="0"/>
+                <a:ea typeface="Roboto" panose="020B0604020202020204" charset="0"/>
+                <a:cs typeface="Calibri"/>
+                <a:sym typeface="Calibri"/>
+              </a:rPr>
+              <a:t>Xamarin</a:t>
+            </a:r>
+            <a:r>
+              <a:rPr lang="en-US" sz="1800" dirty="0" smtClean="0">
+                <a:solidFill>
+                  <a:schemeClr val="bg2"/>
+                </a:solidFill>
+                <a:latin typeface="Roboto" panose="020B0604020202020204" charset="0"/>
+                <a:ea typeface="Roboto" panose="020B0604020202020204" charset="0"/>
+                <a:cs typeface="Calibri"/>
+                <a:sym typeface="Calibri"/>
+              </a:rPr>
+              <a:t> training:</a:t>
+            </a:r>
+          </a:p>
+          <a:p>
+            <a:pPr marL="114300" lvl="0" rtl="0">
+              <a:spcBef>
+                <a:spcPts val="0"/>
+              </a:spcBef>
+              <a:buClr>
+                <a:srgbClr val="FFFFFF"/>
+              </a:buClr>
+              <a:buSzPct val="100000"/>
+            </a:pPr>
+            <a:endParaRPr lang="en-US" sz="1800" dirty="0" smtClean="0">
+              <a:solidFill>
+                <a:schemeClr val="bg2"/>
+              </a:solidFill>
+              <a:latin typeface="Roboto" panose="020B0604020202020204" charset="0"/>
+              <a:ea typeface="Roboto" panose="020B0604020202020204" charset="0"/>
+              <a:cs typeface="Calibri"/>
+              <a:sym typeface="Calibri"/>
+            </a:endParaRPr>
+          </a:p>
+          <a:p>
+            <a:pPr marL="400050" lvl="0" indent="-285750" rtl="0">
+              <a:spcBef>
+                <a:spcPts val="0"/>
+              </a:spcBef>
+              <a:buClr>
+                <a:schemeClr val="bg2"/>
+              </a:buClr>
+              <a:buSzPct val="100000"/>
+              <a:buFont typeface="Wingdings" charset="2"/>
+              <a:buChar char="§"/>
+            </a:pPr>
+            <a:r>
+              <a:rPr lang="en-US" sz="1800" dirty="0" smtClean="0">
+                <a:solidFill>
+                  <a:schemeClr val="bg2"/>
+                </a:solidFill>
+                <a:latin typeface="Roboto" panose="020B0604020202020204" charset="0"/>
+                <a:ea typeface="Roboto" panose="020B0604020202020204" charset="0"/>
+                <a:cs typeface="Calibri"/>
+                <a:sym typeface="Calibri"/>
+              </a:rPr>
+              <a:t>Introduction to </a:t>
+            </a:r>
+            <a:r>
+              <a:rPr lang="en-US" sz="1800" dirty="0" err="1" smtClean="0">
+                <a:solidFill>
+                  <a:schemeClr val="bg2"/>
+                </a:solidFill>
+                <a:latin typeface="Roboto" panose="020B0604020202020204" charset="0"/>
+                <a:ea typeface="Roboto" panose="020B0604020202020204" charset="0"/>
+                <a:cs typeface="Calibri"/>
+                <a:sym typeface="Calibri"/>
+              </a:rPr>
+              <a:t>Xamarin</a:t>
+            </a:r>
+            <a:endParaRPr lang="en-US" sz="1800" dirty="0" smtClean="0">
+              <a:solidFill>
+                <a:schemeClr val="bg2"/>
+              </a:solidFill>
+              <a:latin typeface="Roboto" panose="020B0604020202020204" charset="0"/>
+              <a:ea typeface="Roboto" panose="020B0604020202020204" charset="0"/>
+              <a:cs typeface="Calibri"/>
+              <a:sym typeface="Calibri"/>
+            </a:endParaRPr>
+          </a:p>
+          <a:p>
+            <a:pPr marL="400050" lvl="0" indent="-285750" rtl="0">
+              <a:spcBef>
+                <a:spcPts val="0"/>
+              </a:spcBef>
+              <a:buClr>
+                <a:schemeClr val="bg2"/>
+              </a:buClr>
+              <a:buSzPct val="100000"/>
+              <a:buFont typeface="Wingdings" charset="2"/>
+              <a:buChar char="§"/>
+            </a:pPr>
+            <a:r>
+              <a:rPr lang="en-US" sz="1800" dirty="0" smtClean="0">
+                <a:solidFill>
+                  <a:schemeClr val="bg2"/>
+                </a:solidFill>
+                <a:latin typeface="Roboto" panose="020B0604020202020204" charset="0"/>
+                <a:ea typeface="Roboto" panose="020B0604020202020204" charset="0"/>
+                <a:cs typeface="Calibri"/>
+                <a:sym typeface="Calibri"/>
+              </a:rPr>
+              <a:t>How to create an app with </a:t>
+            </a:r>
+            <a:r>
+              <a:rPr lang="en-US" sz="1800" dirty="0" err="1" smtClean="0">
+                <a:solidFill>
+                  <a:schemeClr val="bg2"/>
+                </a:solidFill>
+                <a:latin typeface="Roboto" panose="020B0604020202020204" charset="0"/>
+                <a:ea typeface="Roboto" panose="020B0604020202020204" charset="0"/>
+                <a:cs typeface="Calibri"/>
+                <a:sym typeface="Calibri"/>
+              </a:rPr>
+              <a:t>Xamarin.iOS</a:t>
+            </a:r>
+            <a:r>
+              <a:rPr lang="en-US" sz="1800" dirty="0" smtClean="0">
+                <a:solidFill>
+                  <a:schemeClr val="bg2"/>
+                </a:solidFill>
+                <a:latin typeface="Roboto" panose="020B0604020202020204" charset="0"/>
+                <a:ea typeface="Roboto" panose="020B0604020202020204" charset="0"/>
+                <a:cs typeface="Calibri"/>
+                <a:sym typeface="Calibri"/>
+              </a:rPr>
+              <a:t>, </a:t>
+            </a:r>
+            <a:r>
+              <a:rPr lang="en-US" sz="1800" dirty="0" err="1" smtClean="0">
+                <a:solidFill>
+                  <a:schemeClr val="bg2"/>
+                </a:solidFill>
+                <a:latin typeface="Roboto" panose="020B0604020202020204" charset="0"/>
+                <a:ea typeface="Roboto" panose="020B0604020202020204" charset="0"/>
+                <a:cs typeface="Calibri"/>
+                <a:sym typeface="Calibri"/>
+              </a:rPr>
+              <a:t>Xamarin.Android</a:t>
+            </a:r>
+            <a:r>
+              <a:rPr lang="en-US" sz="1800" dirty="0" smtClean="0">
+                <a:solidFill>
+                  <a:schemeClr val="bg2"/>
+                </a:solidFill>
+                <a:latin typeface="Roboto" panose="020B0604020202020204" charset="0"/>
+                <a:ea typeface="Roboto" panose="020B0604020202020204" charset="0"/>
+                <a:cs typeface="Calibri"/>
+                <a:sym typeface="Calibri"/>
+              </a:rPr>
+              <a:t> and </a:t>
+            </a:r>
+            <a:r>
+              <a:rPr lang="en-US" sz="1800" dirty="0" err="1" smtClean="0">
+                <a:solidFill>
+                  <a:schemeClr val="bg2"/>
+                </a:solidFill>
+                <a:latin typeface="Roboto" panose="020B0604020202020204" charset="0"/>
+                <a:ea typeface="Roboto" panose="020B0604020202020204" charset="0"/>
+                <a:cs typeface="Calibri"/>
+                <a:sym typeface="Calibri"/>
+              </a:rPr>
+              <a:t>Xamarin.Forms</a:t>
+            </a:r>
+            <a:endParaRPr lang="en-US" sz="1800" dirty="0" smtClean="0">
+              <a:solidFill>
+                <a:schemeClr val="bg2"/>
+              </a:solidFill>
+              <a:latin typeface="Roboto" panose="020B0604020202020204" charset="0"/>
+              <a:ea typeface="Roboto" panose="020B0604020202020204" charset="0"/>
+              <a:cs typeface="Calibri"/>
+              <a:sym typeface="Calibri"/>
+            </a:endParaRPr>
+          </a:p>
+          <a:p>
+            <a:pPr marL="400050" lvl="0" indent="-285750" rtl="0">
+              <a:spcBef>
+                <a:spcPts val="0"/>
+              </a:spcBef>
+              <a:buClr>
+                <a:schemeClr val="bg2"/>
+              </a:buClr>
+              <a:buSzPct val="100000"/>
+              <a:buFont typeface="Wingdings" charset="2"/>
+              <a:buChar char="§"/>
+            </a:pPr>
+            <a:r>
+              <a:rPr lang="en-US" sz="1800" dirty="0" smtClean="0">
+                <a:solidFill>
+                  <a:schemeClr val="bg2"/>
+                </a:solidFill>
+                <a:latin typeface="Roboto" panose="020B0604020202020204" charset="0"/>
+                <a:ea typeface="Roboto" panose="020B0604020202020204" charset="0"/>
+                <a:cs typeface="Calibri"/>
+                <a:sym typeface="Calibri"/>
+              </a:rPr>
+              <a:t>Connect your app with REST API’s</a:t>
+            </a:r>
+          </a:p>
+          <a:p>
+            <a:pPr marL="400050" lvl="0" indent="-285750" rtl="0">
+              <a:spcBef>
+                <a:spcPts val="0"/>
+              </a:spcBef>
+              <a:buClr>
+                <a:schemeClr val="bg2"/>
+              </a:buClr>
+              <a:buSzPct val="100000"/>
+              <a:buFont typeface="Wingdings" charset="2"/>
+              <a:buChar char="§"/>
+            </a:pPr>
+            <a:r>
+              <a:rPr lang="en-US" sz="1800" dirty="0" smtClean="0">
+                <a:solidFill>
+                  <a:schemeClr val="bg2"/>
+                </a:solidFill>
+                <a:latin typeface="Roboto" panose="020B0604020202020204" charset="0"/>
+                <a:ea typeface="Roboto" panose="020B0604020202020204" charset="0"/>
+                <a:cs typeface="Calibri"/>
+                <a:sym typeface="Calibri"/>
+              </a:rPr>
+              <a:t>Publish your app to the store(s)</a:t>
+            </a:r>
+          </a:p>
+          <a:p>
+            <a:pPr marL="400050" lvl="0" indent="-285750" rtl="0">
+              <a:spcBef>
+                <a:spcPts val="0"/>
+              </a:spcBef>
+              <a:buClr>
+                <a:schemeClr val="bg2"/>
+              </a:buClr>
+              <a:buSzPct val="100000"/>
+              <a:buFont typeface="Wingdings" charset="2"/>
+              <a:buChar char="§"/>
+            </a:pPr>
+            <a:r>
+              <a:rPr lang="en-US" sz="1800" dirty="0" smtClean="0">
+                <a:solidFill>
+                  <a:schemeClr val="bg2"/>
+                </a:solidFill>
+                <a:latin typeface="Roboto" panose="020B0604020202020204" charset="0"/>
+                <a:ea typeface="Roboto" panose="020B0604020202020204" charset="0"/>
+                <a:cs typeface="Calibri"/>
+                <a:sym typeface="Calibri"/>
+              </a:rPr>
+              <a:t>Become </a:t>
+            </a:r>
+            <a:r>
+              <a:rPr lang="en-US" sz="1800" dirty="0" err="1" smtClean="0">
+                <a:solidFill>
+                  <a:schemeClr val="bg2"/>
+                </a:solidFill>
+                <a:latin typeface="Roboto" panose="020B0604020202020204" charset="0"/>
+                <a:ea typeface="Roboto" panose="020B0604020202020204" charset="0"/>
+                <a:cs typeface="Calibri"/>
+                <a:sym typeface="Calibri"/>
+              </a:rPr>
+              <a:t>Xamarin</a:t>
+            </a:r>
+            <a:r>
+              <a:rPr lang="en-US" sz="1800" dirty="0" smtClean="0">
+                <a:solidFill>
+                  <a:schemeClr val="bg2"/>
+                </a:solidFill>
+                <a:latin typeface="Roboto" panose="020B0604020202020204" charset="0"/>
+                <a:ea typeface="Roboto" panose="020B0604020202020204" charset="0"/>
+                <a:cs typeface="Calibri"/>
+                <a:sym typeface="Calibri"/>
+              </a:rPr>
+              <a:t> Certified Professional!</a:t>
+            </a:r>
+          </a:p>
+          <a:p>
+            <a:pPr marL="400050" lvl="0" indent="-285750" rtl="0">
+              <a:spcBef>
+                <a:spcPts val="0"/>
+              </a:spcBef>
+              <a:buClr>
+                <a:srgbClr val="FFFFFF"/>
+              </a:buClr>
+              <a:buSzPct val="100000"/>
+              <a:buFont typeface="Arial" panose="020B0604020202020204" pitchFamily="34" charset="0"/>
+              <a:buChar char="•"/>
+            </a:pPr>
+            <a:endParaRPr lang="en-US" sz="1800" dirty="0" smtClean="0">
+              <a:solidFill>
+                <a:schemeClr val="bg2"/>
+              </a:solidFill>
+              <a:latin typeface="Roboto" panose="020B0604020202020204" charset="0"/>
+              <a:ea typeface="Roboto" panose="020B0604020202020204" charset="0"/>
+              <a:cs typeface="Calibri"/>
+              <a:sym typeface="Calibri"/>
+            </a:endParaRPr>
+          </a:p>
+          <a:p>
+            <a:pPr marL="114300" lvl="0" rtl="0">
+              <a:spcBef>
+                <a:spcPts val="0"/>
+              </a:spcBef>
+              <a:buClr>
+                <a:srgbClr val="FFFFFF"/>
+              </a:buClr>
+              <a:buSzPct val="100000"/>
+            </a:pPr>
+            <a:endParaRPr lang="en-US" sz="1800" dirty="0">
+              <a:solidFill>
+                <a:schemeClr val="bg2"/>
+              </a:solidFill>
+              <a:latin typeface="Roboto" panose="020B0604020202020204" charset="0"/>
+              <a:ea typeface="Roboto" panose="020B0604020202020204" charset="0"/>
+              <a:cs typeface="Calibri"/>
+              <a:sym typeface="Calibri"/>
+            </a:endParaRPr>
+          </a:p>
+        </p:txBody>
+      </p:sp>
+      <p:pic>
+        <p:nvPicPr>
+          <p:cNvPr id="4" name="Picture 3"/>
+          <p:cNvPicPr>
+            <a:picLocks noChangeAspect="1"/>
+          </p:cNvPicPr>
+          <p:nvPr/>
+        </p:nvPicPr>
+        <p:blipFill>
+          <a:blip r:embed="rId3">
+            <a:extLst>
+              <a:ext uri="{28A0092B-C50C-407E-A947-70E740481C1C}">
+                <a14:useLocalDpi xmlns:a14="http://schemas.microsoft.com/office/drawing/2010/main" val="0"/>
+              </a:ext>
+            </a:extLst>
+          </a:blip>
+          <a:stretch>
+            <a:fillRect/>
+          </a:stretch>
+        </p:blipFill>
+        <p:spPr>
+          <a:xfrm>
+            <a:off x="1013157" y="3796100"/>
+            <a:ext cx="2268662" cy="1100252"/>
+          </a:xfrm>
+          <a:prstGeom prst="rect">
+            <a:avLst/>
+          </a:prstGeom>
+        </p:spPr>
+      </p:pic>
+      <p:pic>
+        <p:nvPicPr>
+          <p:cNvPr id="6" name="Picture 5"/>
+          <p:cNvPicPr>
+            <a:picLocks noChangeAspect="1"/>
+          </p:cNvPicPr>
+          <p:nvPr/>
+        </p:nvPicPr>
+        <p:blipFill>
+          <a:blip r:embed="rId4">
+            <a:extLst>
+              <a:ext uri="{28A0092B-C50C-407E-A947-70E740481C1C}">
+                <a14:useLocalDpi xmlns:a14="http://schemas.microsoft.com/office/drawing/2010/main" val="0"/>
+              </a:ext>
+            </a:extLst>
+          </a:blip>
+          <a:stretch>
+            <a:fillRect/>
+          </a:stretch>
+        </p:blipFill>
+        <p:spPr>
+          <a:xfrm>
+            <a:off x="3686278" y="3796100"/>
+            <a:ext cx="3221962" cy="1351360"/>
+          </a:xfrm>
+          <a:prstGeom prst="rect">
+            <a:avLst/>
+          </a:prstGeom>
+        </p:spPr>
+      </p:pic>
+      <p:pic>
+        <p:nvPicPr>
+          <p:cNvPr id="1026" name="Picture 2" descr="am-u-shield.png"/>
+          <p:cNvPicPr>
+            <a:picLocks noChangeAspect="1" noChangeArrowheads="1"/>
+          </p:cNvPicPr>
+          <p:nvPr/>
+        </p:nvPicPr>
+        <p:blipFill>
+          <a:blip r:embed="rId5">
+            <a:extLst>
+              <a:ext uri="{28A0092B-C50C-407E-A947-70E740481C1C}">
+                <a14:useLocalDpi xmlns:a14="http://schemas.microsoft.com/office/drawing/2010/main" val="0"/>
+              </a:ext>
+            </a:extLst>
+          </a:blip>
+          <a:srcRect/>
+          <a:stretch>
+            <a:fillRect/>
+          </a:stretch>
+        </p:blipFill>
+        <p:spPr bwMode="auto">
+          <a:xfrm>
+            <a:off x="6244560" y="35122"/>
+            <a:ext cx="1327361" cy="1327361"/>
+          </a:xfrm>
+          <a:prstGeom prst="rect">
+            <a:avLst/>
+          </a:prstGeom>
+          <a:noFill/>
+          <a:extLst>
+            <a:ext uri="{909E8E84-426E-40DD-AFC4-6F175D3DCCD1}">
+              <a14:hiddenFill xmlns:a14="http://schemas.microsoft.com/office/drawing/2010/main">
+                <a:solidFill>
+                  <a:srgbClr val="FFFFFF"/>
+                </a:solidFill>
+              </a14:hiddenFill>
+            </a:ext>
+          </a:extLst>
+        </p:spPr>
+      </p:pic>
+      <p:pic>
+        <p:nvPicPr>
+          <p:cNvPr id="1028" name="Picture 4" descr="roCert.png"/>
+          <p:cNvPicPr>
+            <a:picLocks noChangeAspect="1" noChangeArrowheads="1"/>
+          </p:cNvPicPr>
+          <p:nvPr/>
+        </p:nvPicPr>
+        <p:blipFill>
+          <a:blip r:embed="rId6">
+            <a:extLst>
+              <a:ext uri="{28A0092B-C50C-407E-A947-70E740481C1C}">
+                <a14:useLocalDpi xmlns:a14="http://schemas.microsoft.com/office/drawing/2010/main" val="0"/>
+              </a:ext>
+            </a:extLst>
+          </a:blip>
+          <a:srcRect/>
+          <a:stretch>
+            <a:fillRect/>
+          </a:stretch>
+        </p:blipFill>
+        <p:spPr bwMode="auto">
+          <a:xfrm>
+            <a:off x="7571996" y="66414"/>
+            <a:ext cx="1260229" cy="1264778"/>
+          </a:xfrm>
+          <a:prstGeom prst="rect">
+            <a:avLst/>
+          </a:prstGeom>
+          <a:noFill/>
+          <a:extLst>
+            <a:ext uri="{909E8E84-426E-40DD-AFC4-6F175D3DCCD1}">
+              <a14:hiddenFill xmlns:a14="http://schemas.microsoft.com/office/drawing/2010/main">
+                <a:solidFill>
+                  <a:srgbClr val="FFFFFF"/>
+                </a:solidFill>
+              </a14:hiddenFill>
+            </a:ext>
+          </a:extLst>
+        </p:spPr>
+      </p:pic>
+    </p:spTree>
+    <p:extLst>
+      <p:ext uri="{BB962C8B-B14F-4D97-AF65-F5344CB8AC3E}">
+        <p14:creationId xmlns:p14="http://schemas.microsoft.com/office/powerpoint/2010/main" val="89763932"/>
+      </p:ext>
+    </p:extLst>
+  </p:cSld>
+  <p:clrMapOvr>
+    <a:masterClrMapping/>
+  </p:clrMapOvr>
+  <mc:AlternateContent xmlns:mc="http://schemas.openxmlformats.org/markup-compatibility/2006" xmlns:p14="http://schemas.microsoft.com/office/powerpoint/2010/main">
+    <mc:Choice Requires="p14">
+      <p:transition p14:dur="0"/>
+    </mc:Choice>
+    <mc:Fallback xmlns="">
+      <p:transition/>
+    </mc:Fallback>
+  </mc:AlternateContent>
+</p:sld>
+</file>
+
+<file path=ppt/slides/slide23.xml><?xml version="1.0" encoding="utf-8"?>
 <p:sld xmlns:a="http://schemas.openxmlformats.org/drawingml/2006/main" xmlns:r="http://schemas.openxmlformats.org/officeDocument/2006/relationships" xmlns:p="http://schemas.openxmlformats.org/presentationml/2006/main">
   <p:cSld>
     <p:spTree>
@@ -27454,7 +28223,7 @@
 </p:sld>
 </file>
 
-<file path=ppt/slides/slide23.xml><?xml version="1.0" encoding="utf-8"?>
+<file path=ppt/slides/slide24.xml><?xml version="1.0" encoding="utf-8"?>
 <p:sld xmlns:a="http://schemas.openxmlformats.org/drawingml/2006/main" xmlns:r="http://schemas.openxmlformats.org/officeDocument/2006/relationships" xmlns:p="http://schemas.openxmlformats.org/presentationml/2006/main">
   <p:cSld>
     <p:spTree>
@@ -27616,7 +28385,7 @@
               <a:buNone/>
             </a:pPr>
             <a:r>
-              <a:rPr lang="nl" sz="3600">
+              <a:rPr lang="nl" sz="3600" dirty="0">
                 <a:solidFill>
                   <a:srgbClr val="FFFFFF"/>
                 </a:solidFill>

</xml_diff>